<commit_message>
Fixing the pptx templates
</commit_message>
<xml_diff>
--- a/app/static/template/wed_sermon_template.pptx
+++ b/app/static/template/wed_sermon_template.pptx
@@ -556,7 +556,7 @@
           </a:prstGeom>
         </p:spPr>
         <p:txBody>
-          <a:bodyPr>
+          <a:bodyPr anchor="ctr">
             <a:spAutoFit/>
           </a:bodyPr>
           <a:lstStyle>
@@ -1198,7 +1198,7 @@
         </p:nvSpPr>
         <p:spPr/>
         <p:txBody>
-          <a:bodyPr>
+          <a:bodyPr anchor="ctr">
             <a:normAutofit/>
           </a:bodyPr>
           <a:lstStyle/>

</xml_diff>

<commit_message>
Fixing font size on west coast and fixing shrinking option in wed sermon template
</commit_message>
<xml_diff>
--- a/app/static/template/wed_sermon_template.pptx
+++ b/app/static/template/wed_sermon_template.pptx
@@ -238,7 +238,7 @@
           <a:p>
             <a:fld id="{15D6F61B-DCC9-D848-990F-CAE1C8685861}" type="datetimeFigureOut">
               <a:rPr lang="en-US" smtClean="0"/>
-              <a:t>7/28/23</a:t>
+              <a:t>7/31/23</a:t>
             </a:fld>
             <a:endParaRPr lang="en-US"/>
           </a:p>
@@ -557,7 +557,7 @@
         </p:spPr>
         <p:txBody>
           <a:bodyPr anchor="ctr">
-            <a:spAutoFit/>
+            <a:normAutofit/>
           </a:bodyPr>
           <a:lstStyle>
             <a:lvl1pPr marL="0" indent="0">

</xml_diff>

<commit_message>
Changing the wed sermon font to Nirmala UI
</commit_message>
<xml_diff>
--- a/app/static/template/wed_sermon_template.pptx
+++ b/app/static/template/wed_sermon_template.pptx
@@ -8,7 +8,7 @@
     <p:notesMasterId r:id="rId3"/>
   </p:notesMasterIdLst>
   <p:sldIdLst>
-    <p:sldId id="398" r:id="rId2"/>
+    <p:sldId id="402" r:id="rId2"/>
   </p:sldIdLst>
   <p:sldSz cx="12192000" cy="6858000"/>
   <p:notesSz cx="6858000" cy="9144000"/>
@@ -238,7 +238,7 @@
           <a:p>
             <a:fld id="{15D6F61B-DCC9-D848-990F-CAE1C8685861}" type="datetimeFigureOut">
               <a:rPr lang="en-US" smtClean="0"/>
-              <a:t>7/31/23</a:t>
+              <a:t>8/4/23</a:t>
             </a:fld>
             <a:endParaRPr lang="en-US"/>
           </a:p>
@@ -562,14 +562,14 @@
           <a:lstStyle>
             <a:lvl1pPr marL="0" indent="0">
               <a:buNone/>
-              <a:defRPr b="1">
+              <a:defRPr sz="3000" b="1">
                 <a:effectLst>
                   <a:glow rad="190500">
                     <a:schemeClr val="bg2"/>
                   </a:glow>
                 </a:effectLst>
-                <a:latin typeface="Arial" panose="020B0604020202020204" pitchFamily="34" charset="0"/>
-                <a:cs typeface="Arial" panose="020B0604020202020204" pitchFamily="34" charset="0"/>
+                <a:latin typeface="Nirmala UI" panose="020B0502040204020203" pitchFamily="34" charset="0"/>
+                <a:cs typeface="Nirmala UI" panose="020B0502040204020203" pitchFamily="34" charset="0"/>
               </a:defRPr>
             </a:lvl1pPr>
           </a:lstStyle>
@@ -1172,7 +1172,7 @@
           <p:cNvPr id="2" name="Text Placeholder 1">
             <a:extLst>
               <a:ext uri="{FF2B5EF4-FFF2-40B4-BE49-F238E27FC236}">
-                <a16:creationId xmlns:a16="http://schemas.microsoft.com/office/drawing/2014/main" id="{570C3A67-DE48-273B-68E2-FB98A6802B3F}"/>
+                <a16:creationId xmlns:a16="http://schemas.microsoft.com/office/drawing/2014/main" id="{BA339966-2B50-A0DA-7A30-ED946F747F4D}"/>
               </a:ext>
             </a:extLst>
           </p:cNvPr>
@@ -1195,7 +1195,7 @@
     </p:spTree>
     <p:extLst>
       <p:ext uri="{BB962C8B-B14F-4D97-AF65-F5344CB8AC3E}">
-        <p14:creationId xmlns:p14="http://schemas.microsoft.com/office/powerpoint/2010/main" val="3115501620"/>
+        <p14:creationId xmlns:p14="http://schemas.microsoft.com/office/powerpoint/2010/main" val="2921708422"/>
       </p:ext>
     </p:extLst>
   </p:cSld>

</xml_diff>